<commit_message>
update install and tutorial
</commit_message>
<xml_diff>
--- a/content/en/docimages.pptx
+++ b/content/en/docimages.pptx
@@ -105,6 +105,11 @@
       </a:defRPr>
     </a:lvl9pPr>
   </p:defaultTextStyle>
+  <p:extLst>
+    <p:ext uri="{EFAFB233-063F-42B5-8137-9DF3F51BA10A}">
+      <p15:sldGuideLst xmlns:p15="http://schemas.microsoft.com/office/powerpoint/2012/main"/>
+    </p:ext>
+  </p:extLst>
 </p:presentation>
 </file>
 
@@ -255,7 +260,7 @@
           <a:p>
             <a:fld id="{480DCAB0-7798-4819-9207-C6D11AAC88DF}" type="datetimeFigureOut">
               <a:rPr lang="en-US" smtClean="0"/>
-              <a:t>5/21/2020</a:t>
+              <a:t>7/7/2020</a:t>
             </a:fld>
             <a:endParaRPr lang="en-US"/>
           </a:p>
@@ -453,7 +458,7 @@
           <a:p>
             <a:fld id="{480DCAB0-7798-4819-9207-C6D11AAC88DF}" type="datetimeFigureOut">
               <a:rPr lang="en-US" smtClean="0"/>
-              <a:t>5/21/2020</a:t>
+              <a:t>7/7/2020</a:t>
             </a:fld>
             <a:endParaRPr lang="en-US"/>
           </a:p>
@@ -661,7 +666,7 @@
           <a:p>
             <a:fld id="{480DCAB0-7798-4819-9207-C6D11AAC88DF}" type="datetimeFigureOut">
               <a:rPr lang="en-US" smtClean="0"/>
-              <a:t>5/21/2020</a:t>
+              <a:t>7/7/2020</a:t>
             </a:fld>
             <a:endParaRPr lang="en-US"/>
           </a:p>
@@ -859,7 +864,7 @@
           <a:p>
             <a:fld id="{480DCAB0-7798-4819-9207-C6D11AAC88DF}" type="datetimeFigureOut">
               <a:rPr lang="en-US" smtClean="0"/>
-              <a:t>5/21/2020</a:t>
+              <a:t>7/7/2020</a:t>
             </a:fld>
             <a:endParaRPr lang="en-US"/>
           </a:p>
@@ -1134,7 +1139,7 @@
           <a:p>
             <a:fld id="{480DCAB0-7798-4819-9207-C6D11AAC88DF}" type="datetimeFigureOut">
               <a:rPr lang="en-US" smtClean="0"/>
-              <a:t>5/21/2020</a:t>
+              <a:t>7/7/2020</a:t>
             </a:fld>
             <a:endParaRPr lang="en-US"/>
           </a:p>
@@ -1399,7 +1404,7 @@
           <a:p>
             <a:fld id="{480DCAB0-7798-4819-9207-C6D11AAC88DF}" type="datetimeFigureOut">
               <a:rPr lang="en-US" smtClean="0"/>
-              <a:t>5/21/2020</a:t>
+              <a:t>7/7/2020</a:t>
             </a:fld>
             <a:endParaRPr lang="en-US"/>
           </a:p>
@@ -1811,7 +1816,7 @@
           <a:p>
             <a:fld id="{480DCAB0-7798-4819-9207-C6D11AAC88DF}" type="datetimeFigureOut">
               <a:rPr lang="en-US" smtClean="0"/>
-              <a:t>5/21/2020</a:t>
+              <a:t>7/7/2020</a:t>
             </a:fld>
             <a:endParaRPr lang="en-US"/>
           </a:p>
@@ -1952,7 +1957,7 @@
           <a:p>
             <a:fld id="{480DCAB0-7798-4819-9207-C6D11AAC88DF}" type="datetimeFigureOut">
               <a:rPr lang="en-US" smtClean="0"/>
-              <a:t>5/21/2020</a:t>
+              <a:t>7/7/2020</a:t>
             </a:fld>
             <a:endParaRPr lang="en-US"/>
           </a:p>
@@ -2065,7 +2070,7 @@
           <a:p>
             <a:fld id="{480DCAB0-7798-4819-9207-C6D11AAC88DF}" type="datetimeFigureOut">
               <a:rPr lang="en-US" smtClean="0"/>
-              <a:t>5/21/2020</a:t>
+              <a:t>7/7/2020</a:t>
             </a:fld>
             <a:endParaRPr lang="en-US"/>
           </a:p>
@@ -2376,7 +2381,7 @@
           <a:p>
             <a:fld id="{480DCAB0-7798-4819-9207-C6D11AAC88DF}" type="datetimeFigureOut">
               <a:rPr lang="en-US" smtClean="0"/>
-              <a:t>5/21/2020</a:t>
+              <a:t>7/7/2020</a:t>
             </a:fld>
             <a:endParaRPr lang="en-US"/>
           </a:p>
@@ -2664,7 +2669,7 @@
           <a:p>
             <a:fld id="{480DCAB0-7798-4819-9207-C6D11AAC88DF}" type="datetimeFigureOut">
               <a:rPr lang="en-US" smtClean="0"/>
-              <a:t>5/21/2020</a:t>
+              <a:t>7/7/2020</a:t>
             </a:fld>
             <a:endParaRPr lang="en-US"/>
           </a:p>
@@ -2905,7 +2910,7 @@
           <a:p>
             <a:fld id="{480DCAB0-7798-4819-9207-C6D11AAC88DF}" type="datetimeFigureOut">
               <a:rPr lang="en-US" smtClean="0"/>
-              <a:t>5/21/2020</a:t>
+              <a:t>7/7/2020</a:t>
             </a:fld>
             <a:endParaRPr lang="en-US"/>
           </a:p>
@@ -3394,10 +3399,10 @@
         </p:nvGrpSpPr>
         <p:grpSpPr>
           <a:xfrm>
-            <a:off x="848764" y="1591240"/>
-            <a:ext cx="2932127" cy="3141334"/>
-            <a:chOff x="688338" y="1200346"/>
-            <a:chExt cx="2932127" cy="3141334"/>
+            <a:off x="976616" y="668334"/>
+            <a:ext cx="2926080" cy="2760666"/>
+            <a:chOff x="694385" y="1200346"/>
+            <a:chExt cx="2926080" cy="2760666"/>
           </a:xfrm>
         </p:grpSpPr>
         <p:sp>
@@ -3415,7 +3420,7 @@
           <p:spPr>
             <a:xfrm>
               <a:off x="694385" y="1200346"/>
-              <a:ext cx="2926080" cy="3141334"/>
+              <a:ext cx="2926080" cy="2760666"/>
             </a:xfrm>
             <a:prstGeom prst="rect">
               <a:avLst/>
@@ -3527,7 +3532,7 @@
           </p:blipFill>
           <p:spPr>
             <a:xfrm>
-              <a:off x="829812" y="2028186"/>
+              <a:off x="820527" y="1817785"/>
               <a:ext cx="1109538" cy="924402"/>
             </a:xfrm>
             <a:prstGeom prst="rect">
@@ -3563,7 +3568,7 @@
           </p:blipFill>
           <p:spPr>
             <a:xfrm>
-              <a:off x="776993" y="3106622"/>
+              <a:off x="820527" y="2778238"/>
               <a:ext cx="1109538" cy="924402"/>
             </a:xfrm>
             <a:prstGeom prst="rect">
@@ -3599,7 +3604,7 @@
           </p:blipFill>
           <p:spPr>
             <a:xfrm>
-              <a:off x="2150195" y="2028186"/>
+              <a:off x="2175779" y="1817785"/>
               <a:ext cx="1058372" cy="924402"/>
             </a:xfrm>
             <a:prstGeom prst="rect">
@@ -3635,7 +3640,7 @@
           </p:blipFill>
           <p:spPr>
             <a:xfrm>
-              <a:off x="2139716" y="3102580"/>
+              <a:off x="2148634" y="2831443"/>
               <a:ext cx="1109538" cy="924402"/>
             </a:xfrm>
             <a:prstGeom prst="rect">
@@ -3657,8 +3662,8 @@
           </p:nvSpPr>
           <p:spPr>
             <a:xfrm>
-              <a:off x="691194" y="2664663"/>
-              <a:ext cx="1386918" cy="444070"/>
+              <a:off x="726008" y="2480335"/>
+              <a:ext cx="1386918" cy="400110"/>
             </a:xfrm>
             <a:prstGeom prst="rect">
               <a:avLst/>
@@ -3673,14 +3678,26 @@
             <a:p>
               <a:pPr algn="ctr"/>
               <a:r>
-                <a:rPr lang="en-US" sz="1000" dirty="0"/>
+                <a:rPr lang="en-US" sz="1000" dirty="0">
+                  <a:solidFill>
+                    <a:schemeClr val="accent2">
+                      <a:lumMod val="50000"/>
+                    </a:schemeClr>
+                  </a:solidFill>
+                </a:rPr>
                 <a:t>Payment microservices</a:t>
               </a:r>
             </a:p>
             <a:p>
               <a:pPr algn="ctr"/>
               <a:r>
-                <a:rPr lang="en-US" sz="1000" dirty="0"/>
+                <a:rPr lang="en-US" sz="1000" dirty="0">
+                  <a:solidFill>
+                    <a:schemeClr val="accent2">
+                      <a:lumMod val="50000"/>
+                    </a:schemeClr>
+                  </a:solidFill>
+                </a:rPr>
                 <a:t> Sub-Domain</a:t>
               </a:r>
             </a:p>
@@ -3700,7 +3717,7 @@
           </p:nvSpPr>
           <p:spPr>
             <a:xfrm>
-              <a:off x="2018719" y="2686473"/>
+              <a:off x="2060821" y="2486418"/>
               <a:ext cx="1372492" cy="400110"/>
             </a:xfrm>
             <a:prstGeom prst="rect">
@@ -3755,7 +3772,7 @@
           </p:nvSpPr>
           <p:spPr>
             <a:xfrm>
-              <a:off x="688338" y="3721563"/>
+              <a:off x="713594" y="3460845"/>
               <a:ext cx="1394934" cy="400110"/>
             </a:xfrm>
             <a:prstGeom prst="rect">
@@ -3771,14 +3788,26 @@
             <a:p>
               <a:pPr algn="ctr"/>
               <a:r>
-                <a:rPr lang="en-US" sz="1000" dirty="0"/>
+                <a:rPr lang="en-US" sz="1000" dirty="0">
+                  <a:solidFill>
+                    <a:schemeClr val="accent2">
+                      <a:lumMod val="50000"/>
+                    </a:schemeClr>
+                  </a:solidFill>
+                </a:rPr>
                 <a:t>Currency microservices</a:t>
               </a:r>
             </a:p>
             <a:p>
               <a:pPr algn="ctr"/>
               <a:r>
-                <a:rPr lang="en-US" sz="1000" dirty="0"/>
+                <a:rPr lang="en-US" sz="1000" dirty="0">
+                  <a:solidFill>
+                    <a:schemeClr val="accent2">
+                      <a:lumMod val="50000"/>
+                    </a:schemeClr>
+                  </a:solidFill>
+                </a:rPr>
                 <a:t> Sub-Domain</a:t>
               </a:r>
             </a:p>
@@ -3798,7 +3827,7 @@
           </p:nvSpPr>
           <p:spPr>
             <a:xfrm>
-              <a:off x="1989063" y="3715007"/>
+              <a:off x="2053673" y="3481647"/>
               <a:ext cx="1454245" cy="400110"/>
             </a:xfrm>
             <a:prstGeom prst="rect">
@@ -3952,7 +3981,7 @@
         </p:nvSpPr>
         <p:spPr>
           <a:xfrm>
-            <a:off x="6326394" y="1139217"/>
+            <a:off x="6492717" y="1129080"/>
             <a:ext cx="2274630" cy="369332"/>
           </a:xfrm>
           <a:prstGeom prst="rect">
@@ -4001,7 +4030,7 @@
         </p:blipFill>
         <p:spPr>
           <a:xfrm>
-            <a:off x="9161386" y="1631053"/>
+            <a:off x="7151166" y="1524519"/>
             <a:ext cx="740614" cy="555954"/>
           </a:xfrm>
           <a:prstGeom prst="rect">
@@ -4009,130 +4038,22 @@
           </a:prstGeom>
         </p:spPr>
       </p:pic>
-      <p:pic>
-        <p:nvPicPr>
-          <p:cNvPr id="43" name="Picture 42" descr="A picture containing mirror&#10;&#10;Description automatically generated">
-            <a:extLst>
-              <a:ext uri="{FF2B5EF4-FFF2-40B4-BE49-F238E27FC236}">
-                <a16:creationId xmlns:a16="http://schemas.microsoft.com/office/drawing/2014/main" id="{A5F31A32-D7AF-478C-95B5-224BFAA9389D}"/>
-              </a:ext>
-            </a:extLst>
-          </p:cNvPr>
-          <p:cNvPicPr>
-            <a:picLocks noChangeAspect="1"/>
-          </p:cNvPicPr>
+      <p:sp>
+        <p:nvSpPr>
+          <p:cNvPr id="48" name="TextBox 47">
+            <a:extLst>
+              <a:ext uri="{FF2B5EF4-FFF2-40B4-BE49-F238E27FC236}">
+                <a16:creationId xmlns:a16="http://schemas.microsoft.com/office/drawing/2014/main" id="{ED910C8D-A5B6-429A-A9CA-CEF6CC4E2083}"/>
+              </a:ext>
+            </a:extLst>
+          </p:cNvPr>
+          <p:cNvSpPr txBox="1"/>
           <p:nvPr/>
-        </p:nvPicPr>
-        <p:blipFill>
-          <a:blip r:embed="rId2">
-            <a:extLst>
-              <a:ext uri="{28A0092B-C50C-407E-A947-70E740481C1C}">
-                <a14:useLocalDpi xmlns:a14="http://schemas.microsoft.com/office/drawing/2010/main" val="0"/>
-              </a:ext>
-            </a:extLst>
-          </a:blip>
-          <a:stretch>
-            <a:fillRect/>
-          </a:stretch>
-        </p:blipFill>
+        </p:nvSpPr>
         <p:spPr>
           <a:xfrm>
-            <a:off x="6558388" y="1622664"/>
-            <a:ext cx="740614" cy="555954"/>
-          </a:xfrm>
-          <a:prstGeom prst="rect">
-            <a:avLst/>
-          </a:prstGeom>
-        </p:spPr>
-      </p:pic>
-      <p:pic>
-        <p:nvPicPr>
-          <p:cNvPr id="45" name="Picture 44" descr="A picture containing mirror&#10;&#10;Description automatically generated">
-            <a:extLst>
-              <a:ext uri="{FF2B5EF4-FFF2-40B4-BE49-F238E27FC236}">
-                <a16:creationId xmlns:a16="http://schemas.microsoft.com/office/drawing/2014/main" id="{A0A48A02-2548-4DC4-982D-377122164935}"/>
-              </a:ext>
-            </a:extLst>
-          </p:cNvPr>
-          <p:cNvPicPr>
-            <a:picLocks noChangeAspect="1"/>
-          </p:cNvPicPr>
-          <p:nvPr/>
-        </p:nvPicPr>
-        <p:blipFill>
-          <a:blip r:embed="rId2">
-            <a:extLst>
-              <a:ext uri="{28A0092B-C50C-407E-A947-70E740481C1C}">
-                <a14:useLocalDpi xmlns:a14="http://schemas.microsoft.com/office/drawing/2010/main" val="0"/>
-              </a:ext>
-            </a:extLst>
-          </a:blip>
-          <a:stretch>
-            <a:fillRect/>
-          </a:stretch>
-        </p:blipFill>
-        <p:spPr>
-          <a:xfrm>
-            <a:off x="5230406" y="1638044"/>
-            <a:ext cx="740614" cy="555954"/>
-          </a:xfrm>
-          <a:prstGeom prst="rect">
-            <a:avLst/>
-          </a:prstGeom>
-        </p:spPr>
-      </p:pic>
-      <p:pic>
-        <p:nvPicPr>
-          <p:cNvPr id="47" name="Picture 46" descr="A picture containing mirror&#10;&#10;Description automatically generated">
-            <a:extLst>
-              <a:ext uri="{FF2B5EF4-FFF2-40B4-BE49-F238E27FC236}">
-                <a16:creationId xmlns:a16="http://schemas.microsoft.com/office/drawing/2014/main" id="{C9F67C86-4437-4824-AA66-ACC9D7A9771E}"/>
-              </a:ext>
-            </a:extLst>
-          </p:cNvPr>
-          <p:cNvPicPr>
-            <a:picLocks noChangeAspect="1"/>
-          </p:cNvPicPr>
-          <p:nvPr/>
-        </p:nvPicPr>
-        <p:blipFill>
-          <a:blip r:embed="rId2">
-            <a:extLst>
-              <a:ext uri="{28A0092B-C50C-407E-A947-70E740481C1C}">
-                <a14:useLocalDpi xmlns:a14="http://schemas.microsoft.com/office/drawing/2010/main" val="0"/>
-              </a:ext>
-            </a:extLst>
-          </a:blip>
-          <a:stretch>
-            <a:fillRect/>
-          </a:stretch>
-        </p:blipFill>
-        <p:spPr>
-          <a:xfrm>
-            <a:off x="7911537" y="1622664"/>
-            <a:ext cx="740614" cy="555954"/>
-          </a:xfrm>
-          <a:prstGeom prst="rect">
-            <a:avLst/>
-          </a:prstGeom>
-        </p:spPr>
-      </p:pic>
-      <p:sp>
-        <p:nvSpPr>
-          <p:cNvPr id="48" name="TextBox 47">
-            <a:extLst>
-              <a:ext uri="{FF2B5EF4-FFF2-40B4-BE49-F238E27FC236}">
-                <a16:creationId xmlns:a16="http://schemas.microsoft.com/office/drawing/2014/main" id="{ED910C8D-A5B6-429A-A9CA-CEF6CC4E2083}"/>
-              </a:ext>
-            </a:extLst>
-          </p:cNvPr>
-          <p:cNvSpPr txBox="1"/>
-          <p:nvPr/>
-        </p:nvSpPr>
-        <p:spPr>
-          <a:xfrm>
-            <a:off x="8880290" y="2000759"/>
-            <a:ext cx="1433406" cy="553998"/>
+            <a:off x="6828181" y="1912324"/>
+            <a:ext cx="1433406" cy="400110"/>
           </a:xfrm>
           <a:prstGeom prst="rect">
             <a:avLst/>
@@ -4153,17 +4074,6 @@
                 </a:solidFill>
               </a:rPr>
               <a:t>Front End microservices</a:t>
-            </a:r>
-          </a:p>
-          <a:p>
-            <a:pPr algn="ctr"/>
-            <a:r>
-              <a:rPr lang="en-US" sz="1000" dirty="0">
-                <a:solidFill>
-                  <a:srgbClr val="277989"/>
-                </a:solidFill>
-              </a:rPr>
-              <a:t>Sub-Domain</a:t>
             </a:r>
           </a:p>
           <a:p>
@@ -4176,180 +4086,6 @@
                   </a:schemeClr>
                 </a:solidFill>
               </a:rPr>
-              <a:t> </a:t>
-            </a:r>
-          </a:p>
-        </p:txBody>
-      </p:sp>
-      <p:sp>
-        <p:nvSpPr>
-          <p:cNvPr id="49" name="TextBox 48">
-            <a:extLst>
-              <a:ext uri="{FF2B5EF4-FFF2-40B4-BE49-F238E27FC236}">
-                <a16:creationId xmlns:a16="http://schemas.microsoft.com/office/drawing/2014/main" id="{3595F1F8-DD3B-438E-9E06-E7F03DE1DC44}"/>
-              </a:ext>
-            </a:extLst>
-          </p:cNvPr>
-          <p:cNvSpPr txBox="1"/>
-          <p:nvPr/>
-        </p:nvSpPr>
-        <p:spPr>
-          <a:xfrm>
-            <a:off x="4271421" y="2027440"/>
-            <a:ext cx="2555055" cy="553998"/>
-          </a:xfrm>
-          <a:prstGeom prst="rect">
-            <a:avLst/>
-          </a:prstGeom>
-          <a:noFill/>
-        </p:spPr>
-        <p:txBody>
-          <a:bodyPr wrap="square" rtlCol="0">
-            <a:spAutoFit/>
-          </a:bodyPr>
-          <a:lstStyle/>
-          <a:p>
-            <a:pPr algn="ctr"/>
-            <a:r>
-              <a:rPr lang="en-US" sz="1000" dirty="0">
-                <a:solidFill>
-                  <a:srgbClr val="277989"/>
-                </a:solidFill>
-              </a:rPr>
-              <a:t>Product Catalog microservices</a:t>
-            </a:r>
-          </a:p>
-          <a:p>
-            <a:pPr algn="ctr"/>
-            <a:r>
-              <a:rPr lang="en-US" sz="1000" dirty="0">
-                <a:solidFill>
-                  <a:srgbClr val="277989"/>
-                </a:solidFill>
-              </a:rPr>
-              <a:t>Sub-Domain</a:t>
-            </a:r>
-          </a:p>
-          <a:p>
-            <a:pPr algn="ctr"/>
-            <a:r>
-              <a:rPr lang="en-US" sz="1000" dirty="0"/>
-              <a:t> </a:t>
-            </a:r>
-          </a:p>
-        </p:txBody>
-      </p:sp>
-      <p:sp>
-        <p:nvSpPr>
-          <p:cNvPr id="42" name="TextBox 41">
-            <a:extLst>
-              <a:ext uri="{FF2B5EF4-FFF2-40B4-BE49-F238E27FC236}">
-                <a16:creationId xmlns:a16="http://schemas.microsoft.com/office/drawing/2014/main" id="{7E6A2CE6-F7F7-4C07-99AC-822A8520CBA2}"/>
-              </a:ext>
-            </a:extLst>
-          </p:cNvPr>
-          <p:cNvSpPr txBox="1"/>
-          <p:nvPr/>
-        </p:nvSpPr>
-        <p:spPr>
-          <a:xfrm>
-            <a:off x="7722193" y="2018216"/>
-            <a:ext cx="1143262" cy="553998"/>
-          </a:xfrm>
-          <a:prstGeom prst="rect">
-            <a:avLst/>
-          </a:prstGeom>
-          <a:noFill/>
-        </p:spPr>
-        <p:txBody>
-          <a:bodyPr wrap="none" rtlCol="0">
-            <a:spAutoFit/>
-          </a:bodyPr>
-          <a:lstStyle/>
-          <a:p>
-            <a:pPr algn="ctr"/>
-            <a:r>
-              <a:rPr lang="en-US" sz="1000" dirty="0">
-                <a:solidFill>
-                  <a:srgbClr val="277989"/>
-                </a:solidFill>
-              </a:rPr>
-              <a:t>Cart microservices</a:t>
-            </a:r>
-          </a:p>
-          <a:p>
-            <a:pPr algn="ctr"/>
-            <a:r>
-              <a:rPr lang="en-US" sz="1000" dirty="0">
-                <a:solidFill>
-                  <a:srgbClr val="277989"/>
-                </a:solidFill>
-              </a:rPr>
-              <a:t>Sub-Domain</a:t>
-            </a:r>
-          </a:p>
-          <a:p>
-            <a:pPr algn="ctr"/>
-            <a:r>
-              <a:rPr lang="en-US" sz="1000" dirty="0"/>
-              <a:t> </a:t>
-            </a:r>
-          </a:p>
-        </p:txBody>
-      </p:sp>
-      <p:sp>
-        <p:nvSpPr>
-          <p:cNvPr id="40" name="TextBox 39">
-            <a:extLst>
-              <a:ext uri="{FF2B5EF4-FFF2-40B4-BE49-F238E27FC236}">
-                <a16:creationId xmlns:a16="http://schemas.microsoft.com/office/drawing/2014/main" id="{83ED79B9-2CB8-44F0-BBB5-7A6C998D0D59}"/>
-              </a:ext>
-            </a:extLst>
-          </p:cNvPr>
-          <p:cNvSpPr txBox="1"/>
-          <p:nvPr/>
-        </p:nvSpPr>
-        <p:spPr>
-          <a:xfrm>
-            <a:off x="6407700" y="2000759"/>
-            <a:ext cx="1137184" cy="553998"/>
-          </a:xfrm>
-          <a:prstGeom prst="rect">
-            <a:avLst/>
-          </a:prstGeom>
-          <a:noFill/>
-        </p:spPr>
-        <p:txBody>
-          <a:bodyPr wrap="square" rtlCol="0">
-            <a:spAutoFit/>
-          </a:bodyPr>
-          <a:lstStyle/>
-          <a:p>
-            <a:pPr algn="ctr"/>
-            <a:r>
-              <a:rPr lang="en-US" sz="1000" dirty="0">
-                <a:solidFill>
-                  <a:srgbClr val="277989"/>
-                </a:solidFill>
-              </a:rPr>
-              <a:t>Ad microservices</a:t>
-            </a:r>
-          </a:p>
-          <a:p>
-            <a:pPr algn="ctr"/>
-            <a:r>
-              <a:rPr lang="en-US" sz="1000" dirty="0">
-                <a:solidFill>
-                  <a:srgbClr val="277989"/>
-                </a:solidFill>
-              </a:rPr>
-              <a:t>Sub-Domain</a:t>
-            </a:r>
-          </a:p>
-          <a:p>
-            <a:pPr algn="ctr"/>
-            <a:r>
-              <a:rPr lang="en-US" sz="1000" dirty="0"/>
               <a:t> </a:t>
             </a:r>
           </a:p>
@@ -4630,10 +4366,10 @@
         </p:nvGrpSpPr>
         <p:grpSpPr>
           <a:xfrm>
-            <a:off x="5847128" y="2682815"/>
-            <a:ext cx="3304063" cy="1775201"/>
-            <a:chOff x="5687737" y="2682815"/>
-            <a:chExt cx="3304063" cy="1775201"/>
+            <a:off x="5847127" y="2682815"/>
+            <a:ext cx="3839988" cy="1792619"/>
+            <a:chOff x="5687736" y="2682815"/>
+            <a:chExt cx="3839988" cy="1792619"/>
           </a:xfrm>
         </p:grpSpPr>
         <p:pic>
@@ -4722,8 +4458,8 @@
           </p:nvSpPr>
           <p:spPr>
             <a:xfrm>
-              <a:off x="5687737" y="2708427"/>
-              <a:ext cx="3272390" cy="1587061"/>
+              <a:off x="5687736" y="2708427"/>
+              <a:ext cx="3793261" cy="1587061"/>
             </a:xfrm>
             <a:prstGeom prst="rect">
               <a:avLst/>
@@ -4924,7 +4660,7 @@
           </p:blipFill>
           <p:spPr>
             <a:xfrm>
-              <a:off x="7854652" y="3568016"/>
+              <a:off x="7862373" y="3549384"/>
               <a:ext cx="700106" cy="507161"/>
             </a:xfrm>
             <a:prstGeom prst="rect">
@@ -4960,7 +4696,7 @@
           </p:blipFill>
           <p:spPr>
             <a:xfrm>
-              <a:off x="7828202" y="2940494"/>
+              <a:off x="8691936" y="3145040"/>
               <a:ext cx="700106" cy="507161"/>
             </a:xfrm>
             <a:prstGeom prst="rect">
@@ -5017,7 +4753,7 @@
           </p:nvSpPr>
           <p:spPr>
             <a:xfrm>
-              <a:off x="7704594" y="3262545"/>
+              <a:off x="8598831" y="3542746"/>
               <a:ext cx="928893" cy="553998"/>
             </a:xfrm>
             <a:prstGeom prst="rect">
@@ -5093,10 +4829,12 @@
               <a:r>
                 <a:rPr lang="en-US" sz="1000" dirty="0">
                   <a:solidFill>
-                    <a:srgbClr val="277989"/>
+                    <a:schemeClr val="accent2">
+                      <a:lumMod val="50000"/>
+                    </a:schemeClr>
                   </a:solidFill>
                 </a:rPr>
-                <a:t>AD </a:t>
+                <a:t>Payment </a:t>
               </a:r>
             </a:p>
             <a:p>
@@ -5104,7 +4842,9 @@
               <a:r>
                 <a:rPr lang="en-US" sz="1000" dirty="0">
                   <a:solidFill>
-                    <a:srgbClr val="277989"/>
+                    <a:schemeClr val="accent2">
+                      <a:lumMod val="50000"/>
+                    </a:schemeClr>
                   </a:solidFill>
                 </a:rPr>
                 <a:t>microservices</a:t>
@@ -5133,7 +4873,7 @@
           </p:nvSpPr>
           <p:spPr>
             <a:xfrm>
-              <a:off x="7731854" y="3882117"/>
+              <a:off x="7808116" y="3881332"/>
               <a:ext cx="928893" cy="553998"/>
             </a:xfrm>
             <a:prstGeom prst="rect">
@@ -5151,7 +4891,7 @@
               <a:r>
                 <a:rPr lang="en-US" sz="1000" dirty="0">
                   <a:solidFill>
-                    <a:srgbClr val="277989"/>
+                    <a:srgbClr val="0070C0"/>
                   </a:solidFill>
                 </a:rPr>
                 <a:t>Cart </a:t>
@@ -5162,7 +4902,7 @@
               <a:r>
                 <a:rPr lang="en-US" sz="1000" dirty="0">
                   <a:solidFill>
-                    <a:srgbClr val="277989"/>
+                    <a:srgbClr val="0070C0"/>
                   </a:solidFill>
                 </a:rPr>
                 <a:t>microservices</a:t>
@@ -5195,7 +4935,7 @@
           </p:nvSpPr>
           <p:spPr>
             <a:xfrm>
-              <a:off x="6820790" y="3904018"/>
+              <a:off x="6820790" y="3921436"/>
               <a:ext cx="1051815" cy="553998"/>
             </a:xfrm>
             <a:prstGeom prst="rect">
@@ -5213,7 +4953,7 @@
               <a:r>
                 <a:rPr lang="en-US" sz="1000" dirty="0">
                   <a:solidFill>
-                    <a:srgbClr val="277989"/>
+                    <a:srgbClr val="0070C0"/>
                   </a:solidFill>
                 </a:rPr>
                 <a:t>Product Catalog</a:t>
@@ -5224,7 +4964,7 @@
               <a:r>
                 <a:rPr lang="en-US" sz="1000" dirty="0">
                   <a:solidFill>
-                    <a:srgbClr val="277989"/>
+                    <a:srgbClr val="0070C0"/>
                   </a:solidFill>
                 </a:rPr>
                 <a:t>microservices</a:t>
@@ -5256,8 +4996,8 @@
         </p:nvCxnSpPr>
         <p:spPr>
           <a:xfrm>
-            <a:off x="3208567" y="3993564"/>
-            <a:ext cx="2899773" cy="0"/>
+            <a:off x="3352853" y="3050037"/>
+            <a:ext cx="2464239" cy="376029"/>
           </a:xfrm>
           <a:prstGeom prst="straightConnector1">
             <a:avLst/>
@@ -5303,8 +5043,8 @@
         </p:nvCxnSpPr>
         <p:spPr>
           <a:xfrm>
-            <a:off x="3302075" y="3346467"/>
-            <a:ext cx="2806265" cy="0"/>
+            <a:off x="3367080" y="2615484"/>
+            <a:ext cx="2473666" cy="468355"/>
           </a:xfrm>
           <a:prstGeom prst="straightConnector1">
             <a:avLst/>
@@ -5336,10 +5076,10 @@
       </p:cxnSp>
       <p:cxnSp>
         <p:nvCxnSpPr>
-          <p:cNvPr id="90" name="Straight Arrow Connector 89">
-            <a:extLst>
-              <a:ext uri="{FF2B5EF4-FFF2-40B4-BE49-F238E27FC236}">
-                <a16:creationId xmlns:a16="http://schemas.microsoft.com/office/drawing/2014/main" id="{1D683F79-FC13-4DE7-B12C-9CD6D1062935}"/>
+          <p:cNvPr id="111" name="Straight Arrow Connector 110">
+            <a:extLst>
+              <a:ext uri="{FF2B5EF4-FFF2-40B4-BE49-F238E27FC236}">
+                <a16:creationId xmlns:a16="http://schemas.microsoft.com/office/drawing/2014/main" id="{E04ED834-DF02-4987-ACC4-A1FFD8FC229B}"/>
               </a:ext>
             </a:extLst>
           </p:cNvPr>
@@ -5350,146 +5090,8 @@
         </p:nvCxnSpPr>
         <p:spPr>
           <a:xfrm>
-            <a:off x="6068522" y="2281737"/>
-            <a:ext cx="409962" cy="319947"/>
-          </a:xfrm>
-          <a:prstGeom prst="straightConnector1">
-            <a:avLst/>
-          </a:prstGeom>
-          <a:ln>
-            <a:solidFill>
-              <a:schemeClr val="bg1">
-                <a:lumMod val="65000"/>
-              </a:schemeClr>
-            </a:solidFill>
-            <a:tailEnd type="triangle"/>
-          </a:ln>
-        </p:spPr>
-        <p:style>
-          <a:lnRef idx="1">
-            <a:schemeClr val="accent1"/>
-          </a:lnRef>
-          <a:fillRef idx="0">
-            <a:schemeClr val="accent1"/>
-          </a:fillRef>
-          <a:effectRef idx="0">
-            <a:schemeClr val="accent1"/>
-          </a:effectRef>
-          <a:fontRef idx="minor">
-            <a:schemeClr val="tx1"/>
-          </a:fontRef>
-        </p:style>
-      </p:cxnSp>
-      <p:cxnSp>
-        <p:nvCxnSpPr>
-          <p:cNvPr id="99" name="Straight Arrow Connector 98">
-            <a:extLst>
-              <a:ext uri="{FF2B5EF4-FFF2-40B4-BE49-F238E27FC236}">
-                <a16:creationId xmlns:a16="http://schemas.microsoft.com/office/drawing/2014/main" id="{0A8419AE-D2B1-4B18-9AA2-4E4A49FC3D2D}"/>
-              </a:ext>
-            </a:extLst>
-          </p:cNvPr>
-          <p:cNvCxnSpPr>
-            <a:cxnSpLocks/>
-          </p:cNvCxnSpPr>
-          <p:nvPr/>
-        </p:nvCxnSpPr>
-        <p:spPr>
-          <a:xfrm>
-            <a:off x="6954487" y="2394231"/>
-            <a:ext cx="1" cy="197350"/>
-          </a:xfrm>
-          <a:prstGeom prst="straightConnector1">
-            <a:avLst/>
-          </a:prstGeom>
-          <a:ln>
-            <a:solidFill>
-              <a:schemeClr val="bg1">
-                <a:lumMod val="65000"/>
-              </a:schemeClr>
-            </a:solidFill>
-            <a:tailEnd type="triangle"/>
-          </a:ln>
-        </p:spPr>
-        <p:style>
-          <a:lnRef idx="1">
-            <a:schemeClr val="accent1"/>
-          </a:lnRef>
-          <a:fillRef idx="0">
-            <a:schemeClr val="accent1"/>
-          </a:fillRef>
-          <a:effectRef idx="0">
-            <a:schemeClr val="accent1"/>
-          </a:effectRef>
-          <a:fontRef idx="minor">
-            <a:schemeClr val="tx1"/>
-          </a:fontRef>
-        </p:style>
-      </p:cxnSp>
-      <p:cxnSp>
-        <p:nvCxnSpPr>
-          <p:cNvPr id="111" name="Straight Arrow Connector 110">
-            <a:extLst>
-              <a:ext uri="{FF2B5EF4-FFF2-40B4-BE49-F238E27FC236}">
-                <a16:creationId xmlns:a16="http://schemas.microsoft.com/office/drawing/2014/main" id="{E04ED834-DF02-4987-ACC4-A1FFD8FC229B}"/>
-              </a:ext>
-            </a:extLst>
-          </p:cNvPr>
-          <p:cNvCxnSpPr>
-            <a:cxnSpLocks/>
-          </p:cNvCxnSpPr>
-          <p:nvPr/>
-        </p:nvCxnSpPr>
-        <p:spPr>
-          <a:xfrm>
-            <a:off x="8264238" y="2411812"/>
-            <a:ext cx="1" cy="197350"/>
-          </a:xfrm>
-          <a:prstGeom prst="straightConnector1">
-            <a:avLst/>
-          </a:prstGeom>
-          <a:ln>
-            <a:solidFill>
-              <a:schemeClr val="bg1">
-                <a:lumMod val="65000"/>
-              </a:schemeClr>
-            </a:solidFill>
-            <a:tailEnd type="triangle"/>
-          </a:ln>
-        </p:spPr>
-        <p:style>
-          <a:lnRef idx="1">
-            <a:schemeClr val="accent1"/>
-          </a:lnRef>
-          <a:fillRef idx="0">
-            <a:schemeClr val="accent1"/>
-          </a:fillRef>
-          <a:effectRef idx="0">
-            <a:schemeClr val="accent1"/>
-          </a:effectRef>
-          <a:fontRef idx="minor">
-            <a:schemeClr val="tx1"/>
-          </a:fontRef>
-        </p:style>
-      </p:cxnSp>
-      <p:cxnSp>
-        <p:nvCxnSpPr>
-          <p:cNvPr id="112" name="Straight Arrow Connector 111">
-            <a:extLst>
-              <a:ext uri="{FF2B5EF4-FFF2-40B4-BE49-F238E27FC236}">
-                <a16:creationId xmlns:a16="http://schemas.microsoft.com/office/drawing/2014/main" id="{93802A9E-7368-4965-8F0A-FD2156B1053F}"/>
-              </a:ext>
-            </a:extLst>
-          </p:cNvPr>
-          <p:cNvCxnSpPr>
-            <a:cxnSpLocks/>
-          </p:cNvCxnSpPr>
-          <p:nvPr/>
-        </p:nvCxnSpPr>
-        <p:spPr>
-          <a:xfrm flipH="1">
-            <a:off x="8659801" y="2261258"/>
-            <a:ext cx="371337" cy="336539"/>
+            <a:off x="7552148" y="2142309"/>
+            <a:ext cx="0" cy="508011"/>
           </a:xfrm>
           <a:prstGeom prst="straightConnector1">
             <a:avLst/>
@@ -5719,6 +5321,713 @@
             <a:pPr algn="ctr"/>
             <a:r>
               <a:rPr lang="en-US" sz="1000" dirty="0"/>
+              <a:t> </a:t>
+            </a:r>
+          </a:p>
+        </p:txBody>
+      </p:sp>
+      <p:grpSp>
+        <p:nvGrpSpPr>
+          <p:cNvPr id="86" name="Group 85">
+            <a:extLst>
+              <a:ext uri="{FF2B5EF4-FFF2-40B4-BE49-F238E27FC236}">
+                <a16:creationId xmlns:a16="http://schemas.microsoft.com/office/drawing/2014/main" id="{FD3B42EA-D365-4314-8FED-21F0516C4F07}"/>
+              </a:ext>
+            </a:extLst>
+          </p:cNvPr>
+          <p:cNvGrpSpPr/>
+          <p:nvPr/>
+        </p:nvGrpSpPr>
+        <p:grpSpPr>
+          <a:xfrm>
+            <a:off x="976616" y="3472850"/>
+            <a:ext cx="2926080" cy="2760666"/>
+            <a:chOff x="694385" y="1200346"/>
+            <a:chExt cx="2926080" cy="2760666"/>
+          </a:xfrm>
+        </p:grpSpPr>
+        <p:sp>
+          <p:nvSpPr>
+            <p:cNvPr id="88" name="Rectangle 87">
+              <a:extLst>
+                <a:ext uri="{FF2B5EF4-FFF2-40B4-BE49-F238E27FC236}">
+                  <a16:creationId xmlns:a16="http://schemas.microsoft.com/office/drawing/2014/main" id="{66998DA9-FAB9-414B-93DE-74BE1F956C93}"/>
+                </a:ext>
+              </a:extLst>
+            </p:cNvPr>
+            <p:cNvSpPr/>
+            <p:nvPr/>
+          </p:nvSpPr>
+          <p:spPr>
+            <a:xfrm>
+              <a:off x="694385" y="1200346"/>
+              <a:ext cx="2926080" cy="2760666"/>
+            </a:xfrm>
+            <a:prstGeom prst="rect">
+              <a:avLst/>
+            </a:prstGeom>
+            <a:solidFill>
+              <a:schemeClr val="bg1"/>
+            </a:solidFill>
+            <a:ln>
+              <a:solidFill>
+                <a:schemeClr val="bg1">
+                  <a:lumMod val="85000"/>
+                </a:schemeClr>
+              </a:solidFill>
+            </a:ln>
+          </p:spPr>
+          <p:style>
+            <a:lnRef idx="2">
+              <a:schemeClr val="accent1">
+                <a:shade val="50000"/>
+              </a:schemeClr>
+            </a:lnRef>
+            <a:fillRef idx="1">
+              <a:schemeClr val="accent1"/>
+            </a:fillRef>
+            <a:effectRef idx="0">
+              <a:schemeClr val="accent1"/>
+            </a:effectRef>
+            <a:fontRef idx="minor">
+              <a:schemeClr val="lt1"/>
+            </a:fontRef>
+          </p:style>
+          <p:txBody>
+            <a:bodyPr rtlCol="0" anchor="ctr"/>
+            <a:lstStyle/>
+            <a:p>
+              <a:pPr algn="ctr"/>
+              <a:endParaRPr lang="en-US"/>
+            </a:p>
+          </p:txBody>
+        </p:sp>
+        <p:sp>
+          <p:nvSpPr>
+            <p:cNvPr id="89" name="TextBox 88">
+              <a:extLst>
+                <a:ext uri="{FF2B5EF4-FFF2-40B4-BE49-F238E27FC236}">
+                  <a16:creationId xmlns:a16="http://schemas.microsoft.com/office/drawing/2014/main" id="{C63B10AF-BB97-4584-97D0-7FD66A3629F9}"/>
+                </a:ext>
+              </a:extLst>
+            </p:cNvPr>
+            <p:cNvSpPr txBox="1"/>
+            <p:nvPr/>
+          </p:nvSpPr>
+          <p:spPr>
+            <a:xfrm>
+              <a:off x="859981" y="1259506"/>
+              <a:ext cx="2505891" cy="369332"/>
+            </a:xfrm>
+            <a:prstGeom prst="rect">
+              <a:avLst/>
+            </a:prstGeom>
+            <a:noFill/>
+          </p:spPr>
+          <p:txBody>
+            <a:bodyPr wrap="square" rtlCol="0">
+              <a:spAutoFit/>
+            </a:bodyPr>
+            <a:lstStyle/>
+            <a:p>
+              <a:pPr algn="ctr"/>
+              <a:r>
+                <a:rPr lang="en-US" dirty="0">
+                  <a:solidFill>
+                    <a:schemeClr val="tx1">
+                      <a:lumMod val="75000"/>
+                      <a:lumOff val="25000"/>
+                    </a:schemeClr>
+                  </a:solidFill>
+                </a:rPr>
+                <a:t>Store Services Domain</a:t>
+              </a:r>
+            </a:p>
+          </p:txBody>
+        </p:sp>
+        <p:pic>
+          <p:nvPicPr>
+            <p:cNvPr id="91" name="Picture 90" descr="A picture containing mirror&#10;&#10;Description automatically generated">
+              <a:extLst>
+                <a:ext uri="{FF2B5EF4-FFF2-40B4-BE49-F238E27FC236}">
+                  <a16:creationId xmlns:a16="http://schemas.microsoft.com/office/drawing/2014/main" id="{F65FE214-89FB-4A71-9FB4-54BEA057A7F2}"/>
+                </a:ext>
+              </a:extLst>
+            </p:cNvPr>
+            <p:cNvPicPr>
+              <a:picLocks noChangeAspect="1"/>
+            </p:cNvPicPr>
+            <p:nvPr/>
+          </p:nvPicPr>
+          <p:blipFill>
+            <a:blip r:embed="rId2">
+              <a:extLst>
+                <a:ext uri="{28A0092B-C50C-407E-A947-70E740481C1C}">
+                  <a14:useLocalDpi xmlns:a14="http://schemas.microsoft.com/office/drawing/2010/main" val="0"/>
+                </a:ext>
+              </a:extLst>
+            </a:blip>
+            <a:stretch>
+              <a:fillRect/>
+            </a:stretch>
+          </p:blipFill>
+          <p:spPr>
+            <a:xfrm>
+              <a:off x="820527" y="1817785"/>
+              <a:ext cx="1109538" cy="924402"/>
+            </a:xfrm>
+            <a:prstGeom prst="rect">
+              <a:avLst/>
+            </a:prstGeom>
+          </p:spPr>
+        </p:pic>
+        <p:pic>
+          <p:nvPicPr>
+            <p:cNvPr id="92" name="Picture 91" descr="A picture containing mirror&#10;&#10;Description automatically generated">
+              <a:extLst>
+                <a:ext uri="{FF2B5EF4-FFF2-40B4-BE49-F238E27FC236}">
+                  <a16:creationId xmlns:a16="http://schemas.microsoft.com/office/drawing/2014/main" id="{F7946814-2671-45B8-8182-ADE5F364BCA9}"/>
+                </a:ext>
+              </a:extLst>
+            </p:cNvPr>
+            <p:cNvPicPr>
+              <a:picLocks noChangeAspect="1"/>
+            </p:cNvPicPr>
+            <p:nvPr/>
+          </p:nvPicPr>
+          <p:blipFill>
+            <a:blip r:embed="rId2">
+              <a:extLst>
+                <a:ext uri="{28A0092B-C50C-407E-A947-70E740481C1C}">
+                  <a14:useLocalDpi xmlns:a14="http://schemas.microsoft.com/office/drawing/2010/main" val="0"/>
+                </a:ext>
+              </a:extLst>
+            </a:blip>
+            <a:stretch>
+              <a:fillRect/>
+            </a:stretch>
+          </p:blipFill>
+          <p:spPr>
+            <a:xfrm>
+              <a:off x="820527" y="2778238"/>
+              <a:ext cx="1109538" cy="924402"/>
+            </a:xfrm>
+            <a:prstGeom prst="rect">
+              <a:avLst/>
+            </a:prstGeom>
+          </p:spPr>
+        </p:pic>
+        <p:pic>
+          <p:nvPicPr>
+            <p:cNvPr id="93" name="Picture 92" descr="A picture containing mirror&#10;&#10;Description automatically generated">
+              <a:extLst>
+                <a:ext uri="{FF2B5EF4-FFF2-40B4-BE49-F238E27FC236}">
+                  <a16:creationId xmlns:a16="http://schemas.microsoft.com/office/drawing/2014/main" id="{FE7F589E-FFC4-42F2-A683-07697234CE36}"/>
+                </a:ext>
+              </a:extLst>
+            </p:cNvPr>
+            <p:cNvPicPr>
+              <a:picLocks noChangeAspect="1"/>
+            </p:cNvPicPr>
+            <p:nvPr/>
+          </p:nvPicPr>
+          <p:blipFill>
+            <a:blip r:embed="rId2">
+              <a:extLst>
+                <a:ext uri="{28A0092B-C50C-407E-A947-70E740481C1C}">
+                  <a14:useLocalDpi xmlns:a14="http://schemas.microsoft.com/office/drawing/2010/main" val="0"/>
+                </a:ext>
+              </a:extLst>
+            </a:blip>
+            <a:stretch>
+              <a:fillRect/>
+            </a:stretch>
+          </p:blipFill>
+          <p:spPr>
+            <a:xfrm>
+              <a:off x="2175779" y="1817785"/>
+              <a:ext cx="1058372" cy="924402"/>
+            </a:xfrm>
+            <a:prstGeom prst="rect">
+              <a:avLst/>
+            </a:prstGeom>
+          </p:spPr>
+        </p:pic>
+        <p:pic>
+          <p:nvPicPr>
+            <p:cNvPr id="94" name="Picture 93" descr="A picture containing mirror&#10;&#10;Description automatically generated">
+              <a:extLst>
+                <a:ext uri="{FF2B5EF4-FFF2-40B4-BE49-F238E27FC236}">
+                  <a16:creationId xmlns:a16="http://schemas.microsoft.com/office/drawing/2014/main" id="{81D7A284-C811-4333-8ED9-BF78E4CCD625}"/>
+                </a:ext>
+              </a:extLst>
+            </p:cNvPr>
+            <p:cNvPicPr>
+              <a:picLocks noChangeAspect="1"/>
+            </p:cNvPicPr>
+            <p:nvPr/>
+          </p:nvPicPr>
+          <p:blipFill>
+            <a:blip r:embed="rId2">
+              <a:extLst>
+                <a:ext uri="{28A0092B-C50C-407E-A947-70E740481C1C}">
+                  <a14:useLocalDpi xmlns:a14="http://schemas.microsoft.com/office/drawing/2010/main" val="0"/>
+                </a:ext>
+              </a:extLst>
+            </a:blip>
+            <a:stretch>
+              <a:fillRect/>
+            </a:stretch>
+          </p:blipFill>
+          <p:spPr>
+            <a:xfrm>
+              <a:off x="2148634" y="2831443"/>
+              <a:ext cx="1109538" cy="924402"/>
+            </a:xfrm>
+            <a:prstGeom prst="rect">
+              <a:avLst/>
+            </a:prstGeom>
+          </p:spPr>
+        </p:pic>
+        <p:sp>
+          <p:nvSpPr>
+            <p:cNvPr id="95" name="TextBox 94">
+              <a:extLst>
+                <a:ext uri="{FF2B5EF4-FFF2-40B4-BE49-F238E27FC236}">
+                  <a16:creationId xmlns:a16="http://schemas.microsoft.com/office/drawing/2014/main" id="{27740B8F-FE9E-4E13-890C-014BC1E91DC5}"/>
+                </a:ext>
+              </a:extLst>
+            </p:cNvPr>
+            <p:cNvSpPr txBox="1"/>
+            <p:nvPr/>
+          </p:nvSpPr>
+          <p:spPr>
+            <a:xfrm>
+              <a:off x="911956" y="2480335"/>
+              <a:ext cx="1015021" cy="400110"/>
+            </a:xfrm>
+            <a:prstGeom prst="rect">
+              <a:avLst/>
+            </a:prstGeom>
+            <a:noFill/>
+          </p:spPr>
+          <p:txBody>
+            <a:bodyPr wrap="none" rtlCol="0">
+              <a:spAutoFit/>
+            </a:bodyPr>
+            <a:lstStyle/>
+            <a:p>
+              <a:pPr algn="ctr"/>
+              <a:r>
+                <a:rPr lang="en-US" sz="1000" dirty="0">
+                  <a:solidFill>
+                    <a:srgbClr val="0070C0"/>
+                  </a:solidFill>
+                </a:rPr>
+                <a:t>Product Catalog</a:t>
+              </a:r>
+            </a:p>
+            <a:p>
+              <a:pPr algn="ctr"/>
+              <a:r>
+                <a:rPr lang="en-US" sz="1000" dirty="0">
+                  <a:solidFill>
+                    <a:srgbClr val="0070C0"/>
+                  </a:solidFill>
+                </a:rPr>
+                <a:t> Sub-Domain</a:t>
+              </a:r>
+            </a:p>
+          </p:txBody>
+        </p:sp>
+        <p:sp>
+          <p:nvSpPr>
+            <p:cNvPr id="96" name="TextBox 95">
+              <a:extLst>
+                <a:ext uri="{FF2B5EF4-FFF2-40B4-BE49-F238E27FC236}">
+                  <a16:creationId xmlns:a16="http://schemas.microsoft.com/office/drawing/2014/main" id="{C47560BA-0F06-4E4E-8646-660E24B05851}"/>
+                </a:ext>
+              </a:extLst>
+            </p:cNvPr>
+            <p:cNvSpPr txBox="1"/>
+            <p:nvPr/>
+          </p:nvSpPr>
+          <p:spPr>
+            <a:xfrm>
+              <a:off x="2321309" y="2486418"/>
+              <a:ext cx="851515" cy="400110"/>
+            </a:xfrm>
+            <a:prstGeom prst="rect">
+              <a:avLst/>
+            </a:prstGeom>
+            <a:noFill/>
+          </p:spPr>
+          <p:txBody>
+            <a:bodyPr wrap="none" rtlCol="0">
+              <a:spAutoFit/>
+            </a:bodyPr>
+            <a:lstStyle/>
+            <a:p>
+              <a:pPr algn="ctr"/>
+              <a:r>
+                <a:rPr lang="en-US" sz="1000" dirty="0">
+                  <a:solidFill>
+                    <a:srgbClr val="0070C0"/>
+                  </a:solidFill>
+                </a:rPr>
+                <a:t>Ad Services</a:t>
+              </a:r>
+            </a:p>
+            <a:p>
+              <a:pPr algn="ctr"/>
+              <a:r>
+                <a:rPr lang="en-US" sz="1000" dirty="0">
+                  <a:solidFill>
+                    <a:srgbClr val="0070C0"/>
+                  </a:solidFill>
+                </a:rPr>
+                <a:t> Sub-Domain</a:t>
+              </a:r>
+            </a:p>
+          </p:txBody>
+        </p:sp>
+        <p:sp>
+          <p:nvSpPr>
+            <p:cNvPr id="97" name="TextBox 96">
+              <a:extLst>
+                <a:ext uri="{FF2B5EF4-FFF2-40B4-BE49-F238E27FC236}">
+                  <a16:creationId xmlns:a16="http://schemas.microsoft.com/office/drawing/2014/main" id="{32E8A67E-A473-4C37-A511-9DEFCF089D42}"/>
+                </a:ext>
+              </a:extLst>
+            </p:cNvPr>
+            <p:cNvSpPr txBox="1"/>
+            <p:nvPr/>
+          </p:nvSpPr>
+          <p:spPr>
+            <a:xfrm>
+              <a:off x="985303" y="3460845"/>
+              <a:ext cx="851515" cy="400110"/>
+            </a:xfrm>
+            <a:prstGeom prst="rect">
+              <a:avLst/>
+            </a:prstGeom>
+            <a:noFill/>
+          </p:spPr>
+          <p:txBody>
+            <a:bodyPr wrap="none" rtlCol="0">
+              <a:spAutoFit/>
+            </a:bodyPr>
+            <a:lstStyle/>
+            <a:p>
+              <a:pPr algn="ctr"/>
+              <a:r>
+                <a:rPr lang="en-US" sz="1000" dirty="0">
+                  <a:solidFill>
+                    <a:srgbClr val="0070C0"/>
+                  </a:solidFill>
+                </a:rPr>
+                <a:t>Cart Services</a:t>
+              </a:r>
+            </a:p>
+            <a:p>
+              <a:pPr algn="ctr"/>
+              <a:r>
+                <a:rPr lang="en-US" sz="1000" dirty="0">
+                  <a:solidFill>
+                    <a:srgbClr val="0070C0"/>
+                  </a:solidFill>
+                </a:rPr>
+                <a:t> Sub-Domain</a:t>
+              </a:r>
+            </a:p>
+          </p:txBody>
+        </p:sp>
+        <p:sp>
+          <p:nvSpPr>
+            <p:cNvPr id="98" name="TextBox 97">
+              <a:extLst>
+                <a:ext uri="{FF2B5EF4-FFF2-40B4-BE49-F238E27FC236}">
+                  <a16:creationId xmlns:a16="http://schemas.microsoft.com/office/drawing/2014/main" id="{445179FA-9EAD-407E-B802-C624219FF1B4}"/>
+                </a:ext>
+              </a:extLst>
+            </p:cNvPr>
+            <p:cNvSpPr txBox="1"/>
+            <p:nvPr/>
+          </p:nvSpPr>
+          <p:spPr>
+            <a:xfrm>
+              <a:off x="2355038" y="3481647"/>
+              <a:ext cx="851515" cy="400110"/>
+            </a:xfrm>
+            <a:prstGeom prst="rect">
+              <a:avLst/>
+            </a:prstGeom>
+            <a:noFill/>
+          </p:spPr>
+          <p:txBody>
+            <a:bodyPr wrap="none" rtlCol="0">
+              <a:spAutoFit/>
+            </a:bodyPr>
+            <a:lstStyle/>
+            <a:p>
+              <a:pPr algn="ctr"/>
+              <a:r>
+                <a:rPr lang="en-US" sz="1000" dirty="0">
+                  <a:solidFill>
+                    <a:srgbClr val="0070C0"/>
+                  </a:solidFill>
+                </a:rPr>
+                <a:t>Email</a:t>
+              </a:r>
+            </a:p>
+            <a:p>
+              <a:pPr algn="ctr"/>
+              <a:r>
+                <a:rPr lang="en-US" sz="1000" dirty="0">
+                  <a:solidFill>
+                    <a:srgbClr val="0070C0"/>
+                  </a:solidFill>
+                </a:rPr>
+                <a:t> Sub-Domain</a:t>
+              </a:r>
+            </a:p>
+          </p:txBody>
+        </p:sp>
+      </p:grpSp>
+      <p:cxnSp>
+        <p:nvCxnSpPr>
+          <p:cNvPr id="100" name="Straight Arrow Connector 99">
+            <a:extLst>
+              <a:ext uri="{FF2B5EF4-FFF2-40B4-BE49-F238E27FC236}">
+                <a16:creationId xmlns:a16="http://schemas.microsoft.com/office/drawing/2014/main" id="{FB6334C3-7A19-41EB-97C8-B4A0F87832B6}"/>
+              </a:ext>
+            </a:extLst>
+          </p:cNvPr>
+          <p:cNvCxnSpPr>
+            <a:cxnSpLocks/>
+          </p:cNvCxnSpPr>
+          <p:nvPr/>
+        </p:nvCxnSpPr>
+        <p:spPr>
+          <a:xfrm flipV="1">
+            <a:off x="3263906" y="3987279"/>
+            <a:ext cx="2576840" cy="628164"/>
+          </a:xfrm>
+          <a:prstGeom prst="straightConnector1">
+            <a:avLst/>
+          </a:prstGeom>
+          <a:ln>
+            <a:solidFill>
+              <a:schemeClr val="bg1">
+                <a:lumMod val="65000"/>
+              </a:schemeClr>
+            </a:solidFill>
+            <a:prstDash val="dash"/>
+            <a:tailEnd type="triangle"/>
+          </a:ln>
+        </p:spPr>
+        <p:style>
+          <a:lnRef idx="1">
+            <a:schemeClr val="accent1"/>
+          </a:lnRef>
+          <a:fillRef idx="0">
+            <a:schemeClr val="accent1"/>
+          </a:fillRef>
+          <a:effectRef idx="0">
+            <a:schemeClr val="accent1"/>
+          </a:effectRef>
+          <a:fontRef idx="minor">
+            <a:schemeClr val="tx1"/>
+          </a:fontRef>
+        </p:style>
+      </p:cxnSp>
+      <p:cxnSp>
+        <p:nvCxnSpPr>
+          <p:cNvPr id="101" name="Straight Arrow Connector 100">
+            <a:extLst>
+              <a:ext uri="{FF2B5EF4-FFF2-40B4-BE49-F238E27FC236}">
+                <a16:creationId xmlns:a16="http://schemas.microsoft.com/office/drawing/2014/main" id="{5358F848-845F-4375-9771-5D1F69CAC706}"/>
+              </a:ext>
+            </a:extLst>
+          </p:cNvPr>
+          <p:cNvCxnSpPr>
+            <a:cxnSpLocks/>
+          </p:cNvCxnSpPr>
+          <p:nvPr/>
+        </p:nvCxnSpPr>
+        <p:spPr>
+          <a:xfrm flipV="1">
+            <a:off x="1945834" y="3787487"/>
+            <a:ext cx="3919263" cy="731295"/>
+          </a:xfrm>
+          <a:prstGeom prst="straightConnector1">
+            <a:avLst/>
+          </a:prstGeom>
+          <a:ln>
+            <a:solidFill>
+              <a:schemeClr val="bg1">
+                <a:lumMod val="65000"/>
+              </a:schemeClr>
+            </a:solidFill>
+            <a:prstDash val="dash"/>
+            <a:tailEnd type="triangle"/>
+          </a:ln>
+        </p:spPr>
+        <p:style>
+          <a:lnRef idx="1">
+            <a:schemeClr val="accent1"/>
+          </a:lnRef>
+          <a:fillRef idx="0">
+            <a:schemeClr val="accent1"/>
+          </a:fillRef>
+          <a:effectRef idx="0">
+            <a:schemeClr val="accent1"/>
+          </a:effectRef>
+          <a:fontRef idx="minor">
+            <a:schemeClr val="tx1"/>
+          </a:fontRef>
+        </p:style>
+      </p:cxnSp>
+      <p:cxnSp>
+        <p:nvCxnSpPr>
+          <p:cNvPr id="102" name="Straight Arrow Connector 101">
+            <a:extLst>
+              <a:ext uri="{FF2B5EF4-FFF2-40B4-BE49-F238E27FC236}">
+                <a16:creationId xmlns:a16="http://schemas.microsoft.com/office/drawing/2014/main" id="{C3651AD5-20BD-49CA-9486-1EE59A7D7D35}"/>
+              </a:ext>
+            </a:extLst>
+          </p:cNvPr>
+          <p:cNvCxnSpPr>
+            <a:cxnSpLocks/>
+          </p:cNvCxnSpPr>
+          <p:nvPr/>
+        </p:nvCxnSpPr>
+        <p:spPr>
+          <a:xfrm flipV="1">
+            <a:off x="1803678" y="4238215"/>
+            <a:ext cx="4037068" cy="1301630"/>
+          </a:xfrm>
+          <a:prstGeom prst="straightConnector1">
+            <a:avLst/>
+          </a:prstGeom>
+          <a:ln>
+            <a:solidFill>
+              <a:schemeClr val="bg1">
+                <a:lumMod val="65000"/>
+              </a:schemeClr>
+            </a:solidFill>
+            <a:prstDash val="dash"/>
+            <a:tailEnd type="triangle"/>
+          </a:ln>
+        </p:spPr>
+        <p:style>
+          <a:lnRef idx="1">
+            <a:schemeClr val="accent1"/>
+          </a:lnRef>
+          <a:fillRef idx="0">
+            <a:schemeClr val="accent1"/>
+          </a:fillRef>
+          <a:effectRef idx="0">
+            <a:schemeClr val="accent1"/>
+          </a:effectRef>
+          <a:fontRef idx="minor">
+            <a:schemeClr val="tx1"/>
+          </a:fontRef>
+        </p:style>
+      </p:cxnSp>
+      <p:pic>
+        <p:nvPicPr>
+          <p:cNvPr id="103" name="Picture 102" descr="A picture containing mirror&#10;&#10;Description automatically generated">
+            <a:extLst>
+              <a:ext uri="{FF2B5EF4-FFF2-40B4-BE49-F238E27FC236}">
+                <a16:creationId xmlns:a16="http://schemas.microsoft.com/office/drawing/2014/main" id="{BC812E50-59E4-4936-A971-1F231425DC6F}"/>
+              </a:ext>
+            </a:extLst>
+          </p:cNvPr>
+          <p:cNvPicPr>
+            <a:picLocks noChangeAspect="1"/>
+          </p:cNvPicPr>
+          <p:nvPr/>
+        </p:nvPicPr>
+        <p:blipFill>
+          <a:blip r:embed="rId2">
+            <a:extLst>
+              <a:ext uri="{28A0092B-C50C-407E-A947-70E740481C1C}">
+                <a14:useLocalDpi xmlns:a14="http://schemas.microsoft.com/office/drawing/2010/main" val="0"/>
+              </a:ext>
+            </a:extLst>
+          </a:blip>
+          <a:stretch>
+            <a:fillRect/>
+          </a:stretch>
+        </p:blipFill>
+        <p:spPr>
+          <a:xfrm>
+            <a:off x="7994353" y="2949635"/>
+            <a:ext cx="700106" cy="507161"/>
+          </a:xfrm>
+          <a:prstGeom prst="rect">
+            <a:avLst/>
+          </a:prstGeom>
+        </p:spPr>
+      </p:pic>
+      <p:sp>
+        <p:nvSpPr>
+          <p:cNvPr id="104" name="TextBox 103">
+            <a:extLst>
+              <a:ext uri="{FF2B5EF4-FFF2-40B4-BE49-F238E27FC236}">
+                <a16:creationId xmlns:a16="http://schemas.microsoft.com/office/drawing/2014/main" id="{1F67BBE7-7A5A-4A37-AF73-A9CD386FF367}"/>
+              </a:ext>
+            </a:extLst>
+          </p:cNvPr>
+          <p:cNvSpPr txBox="1"/>
+          <p:nvPr/>
+        </p:nvSpPr>
+        <p:spPr>
+          <a:xfrm>
+            <a:off x="7901369" y="3265747"/>
+            <a:ext cx="928893" cy="553998"/>
+          </a:xfrm>
+          <a:prstGeom prst="rect">
+            <a:avLst/>
+          </a:prstGeom>
+          <a:noFill/>
+        </p:spPr>
+        <p:txBody>
+          <a:bodyPr wrap="none" rtlCol="0">
+            <a:spAutoFit/>
+          </a:bodyPr>
+          <a:lstStyle/>
+          <a:p>
+            <a:pPr algn="ctr"/>
+            <a:r>
+              <a:rPr lang="en-US" sz="1000" dirty="0">
+                <a:solidFill>
+                  <a:srgbClr val="0070C0"/>
+                </a:solidFill>
+              </a:rPr>
+              <a:t>Ad </a:t>
+            </a:r>
+          </a:p>
+          <a:p>
+            <a:pPr algn="ctr"/>
+            <a:r>
+              <a:rPr lang="en-US" sz="1000" dirty="0">
+                <a:solidFill>
+                  <a:srgbClr val="0070C0"/>
+                </a:solidFill>
+              </a:rPr>
+              <a:t>microservices</a:t>
+            </a:r>
+          </a:p>
+          <a:p>
+            <a:pPr algn="ctr"/>
+            <a:r>
+              <a:rPr lang="en-US" sz="1000" dirty="0">
+                <a:solidFill>
+                  <a:srgbClr val="277989"/>
+                </a:solidFill>
+              </a:rPr>
               <a:t> </a:t>
             </a:r>
           </a:p>

</xml_diff>